<commit_message>
little fix and final result
</commit_message>
<xml_diff>
--- a/moneytracker_presentation.pptx
+++ b/moneytracker_presentation.pptx
@@ -12,10 +12,13 @@
     <p:sldId id="263" r:id="rId9"/>
     <p:sldId id="262" r:id="rId10"/>
     <p:sldId id="266" r:id="rId11"/>
-    <p:sldId id="264" r:id="rId12"/>
-    <p:sldId id="267" r:id="rId13"/>
-    <p:sldId id="265" r:id="rId14"/>
-    <p:sldId id="259" r:id="rId15"/>
+    <p:sldId id="268" r:id="rId12"/>
+    <p:sldId id="271" r:id="rId13"/>
+    <p:sldId id="264" r:id="rId14"/>
+    <p:sldId id="270" r:id="rId15"/>
+    <p:sldId id="267" r:id="rId16"/>
+    <p:sldId id="265" r:id="rId17"/>
+    <p:sldId id="259" r:id="rId18"/>
   </p:sldIdLst>
   <p:sldSz cx="12192000" cy="6858000"/>
   <p:notesSz cx="6805613" cy="9944100"/>
@@ -11547,6 +11550,452 @@
           <a:chExt cx="0" cy="0"/>
         </a:xfrm>
       </p:grpSpPr>
+      <p:sp>
+        <p:nvSpPr>
+          <p:cNvPr id="10" name="Title 1">
+            <a:extLst>
+              <a:ext uri="{FF2B5EF4-FFF2-40B4-BE49-F238E27FC236}">
+                <a16:creationId xmlns:a16="http://schemas.microsoft.com/office/drawing/2014/main" id="{222D124E-1B99-4A3E-A3A5-94D190E34124}"/>
+              </a:ext>
+            </a:extLst>
+          </p:cNvPr>
+          <p:cNvSpPr>
+            <a:spLocks noGrp="1"/>
+          </p:cNvSpPr>
+          <p:nvPr>
+            <p:ph type="title"/>
+          </p:nvPr>
+        </p:nvSpPr>
+        <p:spPr>
+          <a:xfrm>
+            <a:off x="623887" y="620713"/>
+            <a:ext cx="10944226" cy="791794"/>
+          </a:xfrm>
+        </p:spPr>
+        <p:txBody>
+          <a:bodyPr/>
+          <a:lstStyle/>
+          <a:p>
+            <a:r>
+              <a:rPr lang="en-US" dirty="0"/>
+              <a:t>Testing</a:t>
+            </a:r>
+          </a:p>
+        </p:txBody>
+      </p:sp>
+      <p:sp>
+        <p:nvSpPr>
+          <p:cNvPr id="2" name="Tijdelijke aanduiding voor dianummer 1">
+            <a:extLst>
+              <a:ext uri="{FF2B5EF4-FFF2-40B4-BE49-F238E27FC236}">
+                <a16:creationId xmlns:a16="http://schemas.microsoft.com/office/drawing/2014/main" id="{A3EC8642-E3F0-449F-91AE-43998925820B}"/>
+              </a:ext>
+            </a:extLst>
+          </p:cNvPr>
+          <p:cNvSpPr>
+            <a:spLocks noGrp="1"/>
+          </p:cNvSpPr>
+          <p:nvPr>
+            <p:ph type="sldNum" sz="quarter" idx="10"/>
+          </p:nvPr>
+        </p:nvSpPr>
+        <p:spPr>
+          <a:xfrm>
+            <a:off x="8923493" y="6339173"/>
+            <a:ext cx="2644619" cy="365125"/>
+          </a:xfrm>
+        </p:spPr>
+        <p:txBody>
+          <a:bodyPr anchor="ctr">
+            <a:normAutofit/>
+          </a:bodyPr>
+          <a:lstStyle/>
+          <a:p>
+            <a:pPr>
+              <a:spcAft>
+                <a:spcPts val="600"/>
+              </a:spcAft>
+            </a:pPr>
+            <a:fld id="{E038E271-308C-2E46-A3EC-56326F9084CC}" type="slidenum">
+              <a:rPr lang="nl-BE" smtClean="0"/>
+              <a:pPr>
+                <a:spcAft>
+                  <a:spcPts val="600"/>
+                </a:spcAft>
+              </a:pPr>
+              <a:t>10</a:t>
+            </a:fld>
+            <a:endParaRPr lang="nl-BE"/>
+          </a:p>
+        </p:txBody>
+      </p:sp>
+      <p:sp>
+        <p:nvSpPr>
+          <p:cNvPr id="12" name="Text Placeholder 3">
+            <a:extLst>
+              <a:ext uri="{FF2B5EF4-FFF2-40B4-BE49-F238E27FC236}">
+                <a16:creationId xmlns:a16="http://schemas.microsoft.com/office/drawing/2014/main" id="{DF619333-6079-4ABB-8FE1-F22F942AC45B}"/>
+              </a:ext>
+            </a:extLst>
+          </p:cNvPr>
+          <p:cNvSpPr>
+            <a:spLocks noGrp="1"/>
+          </p:cNvSpPr>
+          <p:nvPr>
+            <p:ph type="body" sz="quarter" idx="11"/>
+          </p:nvPr>
+        </p:nvSpPr>
+        <p:spPr>
+          <a:xfrm>
+            <a:off x="623888" y="1516380"/>
+            <a:ext cx="10944225" cy="4720907"/>
+          </a:xfrm>
+        </p:spPr>
+        <p:txBody>
+          <a:bodyPr/>
+          <a:lstStyle/>
+          <a:p>
+            <a:r>
+              <a:rPr lang="en-US" dirty="0"/>
+              <a:t>Unit test</a:t>
+            </a:r>
+          </a:p>
+          <a:p>
+            <a:pPr lvl="1"/>
+            <a:r>
+              <a:rPr lang="en-US" dirty="0"/>
+              <a:t>Separated test on Users and Tickets</a:t>
+            </a:r>
+          </a:p>
+          <a:p>
+            <a:r>
+              <a:rPr lang="en-US" dirty="0"/>
+              <a:t>Integration test</a:t>
+            </a:r>
+          </a:p>
+          <a:p>
+            <a:pPr lvl="1"/>
+            <a:r>
+              <a:rPr lang="en-US" dirty="0"/>
+              <a:t>Test on Tickets combined with Users</a:t>
+            </a:r>
+          </a:p>
+          <a:p>
+            <a:pPr lvl="1"/>
+            <a:endParaRPr lang="en-US" dirty="0"/>
+          </a:p>
+        </p:txBody>
+      </p:sp>
+    </p:spTree>
+    <p:extLst>
+      <p:ext uri="{BB962C8B-B14F-4D97-AF65-F5344CB8AC3E}">
+        <p14:creationId xmlns:p14="http://schemas.microsoft.com/office/powerpoint/2010/main" val="2726881764"/>
+      </p:ext>
+    </p:extLst>
+  </p:cSld>
+  <p:clrMapOvr>
+    <a:masterClrMapping/>
+  </p:clrMapOvr>
+</p:sld>
+</file>
+
+<file path=ppt/slides/slide11.xml><?xml version="1.0" encoding="utf-8"?>
+<p:sld xmlns:a="http://schemas.openxmlformats.org/drawingml/2006/main" xmlns:r="http://schemas.openxmlformats.org/officeDocument/2006/relationships" xmlns:p="http://schemas.openxmlformats.org/presentationml/2006/main">
+  <p:cSld>
+    <p:spTree>
+      <p:nvGrpSpPr>
+        <p:cNvPr id="1" name=""/>
+        <p:cNvGrpSpPr/>
+        <p:nvPr/>
+      </p:nvGrpSpPr>
+      <p:grpSpPr>
+        <a:xfrm>
+          <a:off x="0" y="0"/>
+          <a:ext cx="0" cy="0"/>
+          <a:chOff x="0" y="0"/>
+          <a:chExt cx="0" cy="0"/>
+        </a:xfrm>
+      </p:grpSpPr>
+      <p:sp>
+        <p:nvSpPr>
+          <p:cNvPr id="10" name="Title 1">
+            <a:extLst>
+              <a:ext uri="{FF2B5EF4-FFF2-40B4-BE49-F238E27FC236}">
+                <a16:creationId xmlns:a16="http://schemas.microsoft.com/office/drawing/2014/main" id="{222D124E-1B99-4A3E-A3A5-94D190E34124}"/>
+              </a:ext>
+            </a:extLst>
+          </p:cNvPr>
+          <p:cNvSpPr>
+            <a:spLocks noGrp="1"/>
+          </p:cNvSpPr>
+          <p:nvPr>
+            <p:ph type="title"/>
+          </p:nvPr>
+        </p:nvSpPr>
+        <p:spPr>
+          <a:xfrm>
+            <a:off x="623887" y="620713"/>
+            <a:ext cx="10944226" cy="791794"/>
+          </a:xfrm>
+        </p:spPr>
+        <p:txBody>
+          <a:bodyPr/>
+          <a:lstStyle/>
+          <a:p>
+            <a:r>
+              <a:rPr lang="en-US" dirty="0"/>
+              <a:t>Varia</a:t>
+            </a:r>
+          </a:p>
+        </p:txBody>
+      </p:sp>
+      <p:sp>
+        <p:nvSpPr>
+          <p:cNvPr id="2" name="Tijdelijke aanduiding voor dianummer 1">
+            <a:extLst>
+              <a:ext uri="{FF2B5EF4-FFF2-40B4-BE49-F238E27FC236}">
+                <a16:creationId xmlns:a16="http://schemas.microsoft.com/office/drawing/2014/main" id="{A3EC8642-E3F0-449F-91AE-43998925820B}"/>
+              </a:ext>
+            </a:extLst>
+          </p:cNvPr>
+          <p:cNvSpPr>
+            <a:spLocks noGrp="1"/>
+          </p:cNvSpPr>
+          <p:nvPr>
+            <p:ph type="sldNum" sz="quarter" idx="10"/>
+          </p:nvPr>
+        </p:nvSpPr>
+        <p:spPr>
+          <a:xfrm>
+            <a:off x="8923493" y="6339173"/>
+            <a:ext cx="2644619" cy="365125"/>
+          </a:xfrm>
+        </p:spPr>
+        <p:txBody>
+          <a:bodyPr anchor="ctr">
+            <a:normAutofit/>
+          </a:bodyPr>
+          <a:lstStyle/>
+          <a:p>
+            <a:pPr>
+              <a:spcAft>
+                <a:spcPts val="600"/>
+              </a:spcAft>
+            </a:pPr>
+            <a:fld id="{E038E271-308C-2E46-A3EC-56326F9084CC}" type="slidenum">
+              <a:rPr lang="nl-BE" smtClean="0"/>
+              <a:pPr>
+                <a:spcAft>
+                  <a:spcPts val="600"/>
+                </a:spcAft>
+              </a:pPr>
+              <a:t>11</a:t>
+            </a:fld>
+            <a:endParaRPr lang="nl-BE"/>
+          </a:p>
+        </p:txBody>
+      </p:sp>
+      <p:sp>
+        <p:nvSpPr>
+          <p:cNvPr id="12" name="Text Placeholder 3">
+            <a:extLst>
+              <a:ext uri="{FF2B5EF4-FFF2-40B4-BE49-F238E27FC236}">
+                <a16:creationId xmlns:a16="http://schemas.microsoft.com/office/drawing/2014/main" id="{DF619333-6079-4ABB-8FE1-F22F942AC45B}"/>
+              </a:ext>
+            </a:extLst>
+          </p:cNvPr>
+          <p:cNvSpPr>
+            <a:spLocks noGrp="1"/>
+          </p:cNvSpPr>
+          <p:nvPr>
+            <p:ph type="body" sz="quarter" idx="11"/>
+          </p:nvPr>
+        </p:nvSpPr>
+        <p:spPr>
+          <a:xfrm>
+            <a:off x="623888" y="1516380"/>
+            <a:ext cx="10944225" cy="4720907"/>
+          </a:xfrm>
+        </p:spPr>
+        <p:txBody>
+          <a:bodyPr/>
+          <a:lstStyle/>
+          <a:p>
+            <a:r>
+              <a:rPr lang="en-US" dirty="0"/>
+              <a:t>Made use of Github (Github, Github Projects, Pull requests,…)</a:t>
+            </a:r>
+          </a:p>
+          <a:p>
+            <a:r>
+              <a:rPr lang="en-US" dirty="0"/>
+              <a:t>Java doc for the whole project</a:t>
+            </a:r>
+          </a:p>
+          <a:p>
+            <a:r>
+              <a:rPr lang="en-US" dirty="0"/>
+              <a:t>Testing if text fields aren’t empty</a:t>
+            </a:r>
+          </a:p>
+        </p:txBody>
+      </p:sp>
+    </p:spTree>
+    <p:extLst>
+      <p:ext uri="{BB962C8B-B14F-4D97-AF65-F5344CB8AC3E}">
+        <p14:creationId xmlns:p14="http://schemas.microsoft.com/office/powerpoint/2010/main" val="868021336"/>
+      </p:ext>
+    </p:extLst>
+  </p:cSld>
+  <p:clrMapOvr>
+    <a:masterClrMapping/>
+  </p:clrMapOvr>
+</p:sld>
+</file>
+
+<file path=ppt/slides/slide12.xml><?xml version="1.0" encoding="utf-8"?>
+<p:sld xmlns:a="http://schemas.openxmlformats.org/drawingml/2006/main" xmlns:r="http://schemas.openxmlformats.org/officeDocument/2006/relationships" xmlns:p="http://schemas.openxmlformats.org/presentationml/2006/main">
+  <p:cSld>
+    <p:spTree>
+      <p:nvGrpSpPr>
+        <p:cNvPr id="1" name=""/>
+        <p:cNvGrpSpPr/>
+        <p:nvPr/>
+      </p:nvGrpSpPr>
+      <p:grpSpPr>
+        <a:xfrm>
+          <a:off x="0" y="0"/>
+          <a:ext cx="0" cy="0"/>
+          <a:chOff x="0" y="0"/>
+          <a:chExt cx="0" cy="0"/>
+        </a:xfrm>
+      </p:grpSpPr>
+      <p:sp>
+        <p:nvSpPr>
+          <p:cNvPr id="2" name="Titel 1">
+            <a:extLst>
+              <a:ext uri="{FF2B5EF4-FFF2-40B4-BE49-F238E27FC236}">
+                <a16:creationId xmlns:a16="http://schemas.microsoft.com/office/drawing/2014/main" id="{1FC5D900-736E-48F4-9DCB-2AE85967F84C}"/>
+              </a:ext>
+            </a:extLst>
+          </p:cNvPr>
+          <p:cNvSpPr>
+            <a:spLocks noGrp="1"/>
+          </p:cNvSpPr>
+          <p:nvPr>
+            <p:ph type="title"/>
+          </p:nvPr>
+        </p:nvSpPr>
+        <p:spPr/>
+        <p:txBody>
+          <a:bodyPr/>
+          <a:lstStyle/>
+          <a:p>
+            <a:r>
+              <a:rPr lang="nl-BE" dirty="0" err="1"/>
+              <a:t>Demonstration</a:t>
+            </a:r>
+            <a:endParaRPr lang="nl-BE" dirty="0"/>
+          </a:p>
+        </p:txBody>
+      </p:sp>
+      <p:sp>
+        <p:nvSpPr>
+          <p:cNvPr id="3" name="Tijdelijke aanduiding voor dianummer 2">
+            <a:extLst>
+              <a:ext uri="{FF2B5EF4-FFF2-40B4-BE49-F238E27FC236}">
+                <a16:creationId xmlns:a16="http://schemas.microsoft.com/office/drawing/2014/main" id="{B54DB78D-69B1-4FB1-AB1F-E0C4356DEFA6}"/>
+              </a:ext>
+            </a:extLst>
+          </p:cNvPr>
+          <p:cNvSpPr>
+            <a:spLocks noGrp="1"/>
+          </p:cNvSpPr>
+          <p:nvPr>
+            <p:ph type="sldNum" sz="quarter" idx="10"/>
+          </p:nvPr>
+        </p:nvSpPr>
+        <p:spPr/>
+        <p:txBody>
+          <a:bodyPr/>
+          <a:lstStyle/>
+          <a:p>
+            <a:fld id="{E038E271-308C-2E46-A3EC-56326F9084CC}" type="slidenum">
+              <a:rPr lang="nl-BE" smtClean="0"/>
+              <a:pPr/>
+              <a:t>12</a:t>
+            </a:fld>
+            <a:endParaRPr lang="nl-BE" dirty="0"/>
+          </a:p>
+        </p:txBody>
+      </p:sp>
+      <p:sp>
+        <p:nvSpPr>
+          <p:cNvPr id="4" name="Tijdelijke aanduiding voor tekst 3">
+            <a:extLst>
+              <a:ext uri="{FF2B5EF4-FFF2-40B4-BE49-F238E27FC236}">
+                <a16:creationId xmlns:a16="http://schemas.microsoft.com/office/drawing/2014/main" id="{104209DF-6D80-4C21-9C78-AA989DE946A0}"/>
+              </a:ext>
+            </a:extLst>
+          </p:cNvPr>
+          <p:cNvSpPr>
+            <a:spLocks noGrp="1"/>
+          </p:cNvSpPr>
+          <p:nvPr>
+            <p:ph type="body" sz="quarter" idx="11"/>
+          </p:nvPr>
+        </p:nvSpPr>
+        <p:spPr/>
+        <p:txBody>
+          <a:bodyPr>
+            <a:normAutofit/>
+          </a:bodyPr>
+          <a:lstStyle/>
+          <a:p>
+            <a:endParaRPr lang="nl-BE" dirty="0"/>
+          </a:p>
+          <a:p>
+            <a:endParaRPr lang="nl-BE" dirty="0"/>
+          </a:p>
+          <a:p>
+            <a:pPr lvl="1"/>
+            <a:endParaRPr lang="nl-BE" dirty="0"/>
+          </a:p>
+          <a:p>
+            <a:endParaRPr lang="nl-BE" dirty="0"/>
+          </a:p>
+        </p:txBody>
+      </p:sp>
+    </p:spTree>
+    <p:extLst>
+      <p:ext uri="{BB962C8B-B14F-4D97-AF65-F5344CB8AC3E}">
+        <p14:creationId xmlns:p14="http://schemas.microsoft.com/office/powerpoint/2010/main" val="1344382084"/>
+      </p:ext>
+    </p:extLst>
+  </p:cSld>
+  <p:clrMapOvr>
+    <a:masterClrMapping/>
+  </p:clrMapOvr>
+</p:sld>
+</file>
+
+<file path=ppt/slides/slide13.xml><?xml version="1.0" encoding="utf-8"?>
+<p:sld xmlns:a="http://schemas.openxmlformats.org/drawingml/2006/main" xmlns:r="http://schemas.openxmlformats.org/officeDocument/2006/relationships" xmlns:p="http://schemas.openxmlformats.org/presentationml/2006/main">
+  <p:cSld>
+    <p:spTree>
+      <p:nvGrpSpPr>
+        <p:cNvPr id="1" name=""/>
+        <p:cNvGrpSpPr/>
+        <p:nvPr/>
+      </p:nvGrpSpPr>
+      <p:grpSpPr>
+        <a:xfrm>
+          <a:off x="0" y="0"/>
+          <a:ext cx="0" cy="0"/>
+          <a:chOff x="0" y="0"/>
+          <a:chExt cx="0" cy="0"/>
+        </a:xfrm>
+      </p:grpSpPr>
       <p:pic>
         <p:nvPicPr>
           <p:cNvPr id="11" name="Tijdelijke aanduiding voor afbeelding 10">
@@ -12043,13 +12492,33 @@
           <a:p>
             <a:pPr lvl="1"/>
             <a:r>
-              <a:rPr lang="nl-BE"/>
-              <a:t>Used for user and ticket database</a:t>
-            </a:r>
-          </a:p>
-          <a:p>
-            <a:r>
-              <a:rPr lang="nl-BE"/>
+              <a:rPr lang="nl-BE" dirty="0" err="1"/>
+              <a:t>Used</a:t>
+            </a:r>
+            <a:r>
+              <a:rPr lang="nl-BE" dirty="0"/>
+              <a:t> </a:t>
+            </a:r>
+            <a:r>
+              <a:rPr lang="nl-BE" dirty="0" err="1"/>
+              <a:t>for</a:t>
+            </a:r>
+            <a:r>
+              <a:rPr lang="nl-BE" dirty="0"/>
+              <a:t> user </a:t>
+            </a:r>
+            <a:r>
+              <a:rPr lang="nl-BE" dirty="0" err="1"/>
+              <a:t>and</a:t>
+            </a:r>
+            <a:r>
+              <a:rPr lang="nl-BE" dirty="0"/>
+              <a:t> ticket database</a:t>
+            </a:r>
+          </a:p>
+          <a:p>
+            <a:r>
+              <a:rPr lang="nl-BE" dirty="0" err="1"/>
               <a:t>Observer</a:t>
             </a:r>
             <a:endParaRPr lang="nl-BE" dirty="0"/>
@@ -12057,20 +12526,101 @@
           <a:p>
             <a:pPr lvl="1"/>
             <a:r>
-              <a:rPr lang="nl-BE"/>
-              <a:t>Used for the GUI to automaticly refresh overviews</a:t>
-            </a:r>
+              <a:rPr lang="nl-BE" dirty="0" err="1"/>
+              <a:t>Used</a:t>
+            </a:r>
+            <a:r>
+              <a:rPr lang="nl-BE" dirty="0"/>
+              <a:t> </a:t>
+            </a:r>
+            <a:r>
+              <a:rPr lang="nl-BE" dirty="0" err="1"/>
+              <a:t>for</a:t>
+            </a:r>
+            <a:r>
+              <a:rPr lang="nl-BE" dirty="0"/>
+              <a:t> </a:t>
+            </a:r>
+            <a:r>
+              <a:rPr lang="nl-BE" dirty="0" err="1"/>
+              <a:t>the</a:t>
+            </a:r>
+            <a:r>
+              <a:rPr lang="nl-BE" dirty="0"/>
+              <a:t> GUI </a:t>
+            </a:r>
+            <a:r>
+              <a:rPr lang="nl-BE" dirty="0" err="1"/>
+              <a:t>to</a:t>
+            </a:r>
+            <a:r>
+              <a:rPr lang="nl-BE" dirty="0"/>
+              <a:t> </a:t>
+            </a:r>
+            <a:r>
+              <a:rPr lang="nl-BE" dirty="0" err="1"/>
+              <a:t>automaticly</a:t>
+            </a:r>
+            <a:r>
+              <a:rPr lang="nl-BE" dirty="0"/>
+              <a:t> </a:t>
+            </a:r>
+            <a:r>
+              <a:rPr lang="nl-BE" dirty="0" err="1"/>
+              <a:t>refresh</a:t>
+            </a:r>
+            <a:r>
+              <a:rPr lang="nl-BE" dirty="0"/>
+              <a:t> </a:t>
+            </a:r>
+            <a:r>
+              <a:rPr lang="nl-BE" dirty="0" err="1"/>
+              <a:t>overviews</a:t>
+            </a:r>
+            <a:endParaRPr lang="nl-BE" dirty="0"/>
           </a:p>
           <a:p>
             <a:pPr lvl="1"/>
             <a:r>
-              <a:rPr lang="nl-BE"/>
-              <a:t>The observers watch the databases for change</a:t>
-            </a:r>
-          </a:p>
-          <a:p>
-            <a:r>
-              <a:rPr lang="nl-BE"/>
+              <a:rPr lang="nl-BE" dirty="0"/>
+              <a:t>The </a:t>
+            </a:r>
+            <a:r>
+              <a:rPr lang="nl-BE" dirty="0" err="1"/>
+              <a:t>observers</a:t>
+            </a:r>
+            <a:r>
+              <a:rPr lang="nl-BE" dirty="0"/>
+              <a:t> </a:t>
+            </a:r>
+            <a:r>
+              <a:rPr lang="nl-BE" dirty="0" err="1"/>
+              <a:t>watch</a:t>
+            </a:r>
+            <a:r>
+              <a:rPr lang="nl-BE" dirty="0"/>
+              <a:t> </a:t>
+            </a:r>
+            <a:r>
+              <a:rPr lang="nl-BE" dirty="0" err="1"/>
+              <a:t>the</a:t>
+            </a:r>
+            <a:r>
+              <a:rPr lang="nl-BE" dirty="0"/>
+              <a:t> databases </a:t>
+            </a:r>
+            <a:r>
+              <a:rPr lang="nl-BE" dirty="0" err="1"/>
+              <a:t>for</a:t>
+            </a:r>
+            <a:r>
+              <a:rPr lang="nl-BE" dirty="0"/>
+              <a:t> change</a:t>
+            </a:r>
+          </a:p>
+          <a:p>
+            <a:r>
+              <a:rPr lang="nl-BE" dirty="0"/>
               <a:t>Abstract </a:t>
             </a:r>
             <a:r>
@@ -12082,47 +12632,91 @@
           <a:p>
             <a:pPr lvl="1"/>
             <a:r>
-              <a:rPr lang="nl-BE"/>
+              <a:rPr lang="nl-BE" dirty="0" err="1"/>
               <a:t>Ticketfactory</a:t>
             </a:r>
-          </a:p>
-          <a:p>
-            <a:r>
-              <a:rPr lang="nl-BE"/>
+            <a:endParaRPr lang="nl-BE" dirty="0"/>
+          </a:p>
+          <a:p>
+            <a:r>
+              <a:rPr lang="nl-BE" dirty="0"/>
               <a:t>MVC</a:t>
             </a:r>
+          </a:p>
+          <a:p>
+            <a:pPr lvl="1"/>
+            <a:r>
+              <a:rPr lang="nl-BE" dirty="0"/>
+              <a:t>GUI </a:t>
+            </a:r>
+            <a:r>
+              <a:rPr lang="nl-BE" dirty="0" err="1"/>
+              <a:t>interacts</a:t>
+            </a:r>
+            <a:r>
+              <a:rPr lang="nl-BE" dirty="0"/>
+              <a:t> </a:t>
+            </a:r>
+            <a:r>
+              <a:rPr lang="nl-BE" dirty="0" err="1"/>
+              <a:t>through</a:t>
+            </a:r>
+            <a:r>
+              <a:rPr lang="nl-BE" dirty="0"/>
+              <a:t> </a:t>
+            </a:r>
+            <a:r>
+              <a:rPr lang="nl-BE" dirty="0" err="1"/>
+              <a:t>the</a:t>
+            </a:r>
+            <a:r>
+              <a:rPr lang="nl-BE" dirty="0"/>
+              <a:t> controller</a:t>
+            </a:r>
+          </a:p>
+          <a:p>
+            <a:r>
+              <a:rPr lang="nl-BE" dirty="0"/>
+              <a:t>State </a:t>
+            </a:r>
+          </a:p>
+          <a:p>
+            <a:pPr lvl="1"/>
+            <a:r>
+              <a:rPr lang="nl-BE" dirty="0"/>
+              <a:t>GUI has a light </a:t>
+            </a:r>
+            <a:r>
+              <a:rPr lang="nl-BE" dirty="0" err="1"/>
+              <a:t>and</a:t>
+            </a:r>
+            <a:r>
+              <a:rPr lang="nl-BE" dirty="0"/>
+              <a:t> </a:t>
+            </a:r>
+            <a:r>
+              <a:rPr lang="nl-BE" dirty="0" err="1"/>
+              <a:t>dark</a:t>
+            </a:r>
+            <a:r>
+              <a:rPr lang="nl-BE" dirty="0"/>
+              <a:t> </a:t>
+            </a:r>
+            <a:r>
+              <a:rPr lang="nl-BE" dirty="0" err="1"/>
+              <a:t>theme</a:t>
+            </a:r>
             <a:endParaRPr lang="nl-BE" dirty="0"/>
           </a:p>
           <a:p>
+            <a:endParaRPr lang="nl-BE" dirty="0"/>
+          </a:p>
+          <a:p>
+            <a:endParaRPr lang="nl-BE" dirty="0"/>
+          </a:p>
+          <a:p>
             <a:pPr lvl="1"/>
-            <a:r>
-              <a:rPr lang="nl-BE"/>
-              <a:t>GUI interacts through the controller</a:t>
-            </a:r>
-          </a:p>
-          <a:p>
-            <a:r>
-              <a:rPr lang="nl-BE"/>
-              <a:t>State </a:t>
-            </a:r>
             <a:endParaRPr lang="nl-BE" dirty="0"/>
-          </a:p>
-          <a:p>
-            <a:pPr lvl="1"/>
-            <a:r>
-              <a:rPr lang="nl-BE"/>
-              <a:t>GUI has a light and dark theme</a:t>
-            </a:r>
-          </a:p>
-          <a:p>
-            <a:endParaRPr lang="nl-BE" dirty="0"/>
-          </a:p>
-          <a:p>
-            <a:endParaRPr lang="nl-BE" dirty="0"/>
-          </a:p>
-          <a:p>
-            <a:pPr lvl="1"/>
-            <a:endParaRPr lang="nl-BE"/>
           </a:p>
           <a:p>
             <a:endParaRPr lang="nl-BE" dirty="0"/>
@@ -12728,10 +13322,42 @@
       </p:grpSpPr>
       <p:sp>
         <p:nvSpPr>
-          <p:cNvPr id="2" name="Titel 1">
-            <a:extLst>
-              <a:ext uri="{FF2B5EF4-FFF2-40B4-BE49-F238E27FC236}">
-                <a16:creationId xmlns:a16="http://schemas.microsoft.com/office/drawing/2014/main" id="{1FC5D900-736E-48F4-9DCB-2AE85967F84C}"/>
+          <p:cNvPr id="2" name="Tijdelijke aanduiding voor dianummer 1">
+            <a:extLst>
+              <a:ext uri="{FF2B5EF4-FFF2-40B4-BE49-F238E27FC236}">
+                <a16:creationId xmlns:a16="http://schemas.microsoft.com/office/drawing/2014/main" id="{4DCB7844-3C7F-4BF1-8962-E93CD35F2A25}"/>
+              </a:ext>
+            </a:extLst>
+          </p:cNvPr>
+          <p:cNvSpPr>
+            <a:spLocks noGrp="1"/>
+          </p:cNvSpPr>
+          <p:nvPr>
+            <p:ph type="sldNum" sz="quarter" idx="10"/>
+          </p:nvPr>
+        </p:nvSpPr>
+        <p:spPr/>
+        <p:txBody>
+          <a:bodyPr/>
+          <a:lstStyle/>
+          <a:p>
+            <a:fld id="{E038E271-308C-2E46-A3EC-56326F9084CC}" type="slidenum">
+              <a:rPr lang="nl-BE" smtClean="0"/>
+              <a:pPr/>
+              <a:t>7</a:t>
+            </a:fld>
+            <a:endParaRPr lang="nl-BE" dirty="0">
+              <a:latin typeface="Calibri Light" panose="020F0302020204030204" pitchFamily="34" charset="0"/>
+            </a:endParaRPr>
+          </a:p>
+        </p:txBody>
+      </p:sp>
+      <p:sp>
+        <p:nvSpPr>
+          <p:cNvPr id="3" name="Titel 2">
+            <a:extLst>
+              <a:ext uri="{FF2B5EF4-FFF2-40B4-BE49-F238E27FC236}">
+                <a16:creationId xmlns:a16="http://schemas.microsoft.com/office/drawing/2014/main" id="{7EBC9002-4E94-4D9B-9660-90619D5C76DA}"/>
               </a:ext>
             </a:extLst>
           </p:cNvPr>
@@ -12742,57 +13368,29 @@
             <p:ph type="title"/>
           </p:nvPr>
         </p:nvSpPr>
-        <p:spPr/>
+        <p:spPr>
+          <a:xfrm>
+            <a:off x="811763" y="369070"/>
+            <a:ext cx="5003800" cy="1385085"/>
+          </a:xfrm>
+        </p:spPr>
         <p:txBody>
           <a:bodyPr/>
           <a:lstStyle/>
           <a:p>
             <a:r>
-              <a:rPr lang="nl-BE" dirty="0" err="1"/>
-              <a:t>Sequence</a:t>
-            </a:r>
-            <a:r>
-              <a:rPr lang="nl-BE" dirty="0"/>
-              <a:t> diagram </a:t>
-            </a:r>
-            <a:r>
-              <a:rPr lang="nl-BE" dirty="0" err="1"/>
-              <a:t>for</a:t>
-            </a:r>
-            <a:r>
-              <a:rPr lang="nl-BE" dirty="0"/>
-              <a:t> </a:t>
-            </a:r>
-            <a:r>
-              <a:rPr lang="nl-BE" dirty="0" err="1"/>
-              <a:t>calculating</a:t>
-            </a:r>
-            <a:r>
-              <a:rPr lang="nl-BE" dirty="0"/>
-              <a:t> </a:t>
-            </a:r>
-            <a:r>
-              <a:rPr lang="nl-BE" dirty="0" err="1"/>
-              <a:t>the</a:t>
-            </a:r>
-            <a:r>
-              <a:rPr lang="nl-BE" dirty="0"/>
-              <a:t> </a:t>
-            </a:r>
-            <a:r>
-              <a:rPr lang="nl-BE" dirty="0" err="1"/>
-              <a:t>bill</a:t>
-            </a:r>
-            <a:endParaRPr lang="nl-BE" dirty="0"/>
-          </a:p>
-        </p:txBody>
-      </p:sp>
-      <p:sp>
-        <p:nvSpPr>
-          <p:cNvPr id="3" name="Tijdelijke aanduiding voor dianummer 2">
-            <a:extLst>
-              <a:ext uri="{FF2B5EF4-FFF2-40B4-BE49-F238E27FC236}">
-                <a16:creationId xmlns:a16="http://schemas.microsoft.com/office/drawing/2014/main" id="{B54DB78D-69B1-4FB1-AB1F-E0C4356DEFA6}"/>
+              <a:rPr lang="en-GB" dirty="0"/>
+              <a:t>Factory</a:t>
+            </a:r>
+          </a:p>
+        </p:txBody>
+      </p:sp>
+      <p:sp>
+        <p:nvSpPr>
+          <p:cNvPr id="5" name="Tijdelijke aanduiding voor inhoud 4">
+            <a:extLst>
+              <a:ext uri="{FF2B5EF4-FFF2-40B4-BE49-F238E27FC236}">
+                <a16:creationId xmlns:a16="http://schemas.microsoft.com/office/drawing/2014/main" id="{1EF1C9A6-2D1C-4962-A680-0FD9703A1581}"/>
               </a:ext>
             </a:extLst>
           </p:cNvPr>
@@ -12800,66 +13398,37 @@
             <a:spLocks noGrp="1"/>
           </p:cNvSpPr>
           <p:nvPr>
-            <p:ph type="sldNum" sz="quarter" idx="10"/>
+            <p:ph sz="quarter" idx="12"/>
           </p:nvPr>
         </p:nvSpPr>
-        <p:spPr/>
-        <p:txBody>
-          <a:bodyPr/>
-          <a:lstStyle/>
-          <a:p>
-            <a:fld id="{E038E271-308C-2E46-A3EC-56326F9084CC}" type="slidenum">
-              <a:rPr lang="nl-BE" smtClean="0"/>
-              <a:pPr/>
-              <a:t>7</a:t>
-            </a:fld>
-            <a:endParaRPr lang="nl-BE" dirty="0"/>
-          </a:p>
-        </p:txBody>
-      </p:sp>
-      <p:sp>
-        <p:nvSpPr>
-          <p:cNvPr id="4" name="Tijdelijke aanduiding voor tekst 3">
-            <a:extLst>
-              <a:ext uri="{FF2B5EF4-FFF2-40B4-BE49-F238E27FC236}">
-                <a16:creationId xmlns:a16="http://schemas.microsoft.com/office/drawing/2014/main" id="{104209DF-6D80-4C21-9C78-AA989DE946A0}"/>
-              </a:ext>
-            </a:extLst>
-          </p:cNvPr>
-          <p:cNvSpPr>
-            <a:spLocks noGrp="1"/>
-          </p:cNvSpPr>
-          <p:nvPr>
-            <p:ph type="body" sz="quarter" idx="11"/>
-          </p:nvPr>
-        </p:nvSpPr>
-        <p:spPr/>
+        <p:spPr>
+          <a:xfrm>
+            <a:off x="948107" y="5604553"/>
+            <a:ext cx="5004000" cy="614074"/>
+          </a:xfrm>
+        </p:spPr>
         <p:txBody>
           <a:bodyPr>
             <a:normAutofit/>
           </a:bodyPr>
           <a:lstStyle/>
           <a:p>
-            <a:endParaRPr lang="nl-BE" dirty="0"/>
-          </a:p>
-          <a:p>
-            <a:endParaRPr lang="nl-BE" dirty="0"/>
-          </a:p>
-          <a:p>
-            <a:pPr lvl="1"/>
-            <a:endParaRPr lang="nl-BE" dirty="0"/>
-          </a:p>
-          <a:p>
-            <a:endParaRPr lang="nl-BE" dirty="0"/>
+            <a:r>
+              <a:rPr lang="en-GB" sz="1800" dirty="0"/>
+              <a:t>Create ticket using a method of the Factory class</a:t>
+            </a:r>
+          </a:p>
+          <a:p>
+            <a:endParaRPr lang="en-GB" sz="1800" dirty="0"/>
           </a:p>
         </p:txBody>
       </p:sp>
       <p:pic>
         <p:nvPicPr>
-          <p:cNvPr id="6" name="Afbeelding 5">
-            <a:extLst>
-              <a:ext uri="{FF2B5EF4-FFF2-40B4-BE49-F238E27FC236}">
-                <a16:creationId xmlns:a16="http://schemas.microsoft.com/office/drawing/2014/main" id="{8DE1BE9A-1692-44E0-AA0C-436B09E06208}"/>
+          <p:cNvPr id="7" name="Afbeelding 6">
+            <a:extLst>
+              <a:ext uri="{FF2B5EF4-FFF2-40B4-BE49-F238E27FC236}">
+                <a16:creationId xmlns:a16="http://schemas.microsoft.com/office/drawing/2014/main" id="{4D02BA13-6B09-4A8F-97C4-021D94A11988}"/>
               </a:ext>
             </a:extLst>
           </p:cNvPr>
@@ -12876,8 +13445,8 @@
         </p:blipFill>
         <p:spPr>
           <a:xfrm>
-            <a:off x="2033361" y="1243920"/>
-            <a:ext cx="8125278" cy="5379494"/>
+            <a:off x="1041635" y="1109609"/>
+            <a:ext cx="9820943" cy="4130211"/>
           </a:xfrm>
           <a:prstGeom prst="rect">
             <a:avLst/>
@@ -12887,7 +13456,7 @@
     </p:spTree>
     <p:extLst>
       <p:ext uri="{BB962C8B-B14F-4D97-AF65-F5344CB8AC3E}">
-        <p14:creationId xmlns:p14="http://schemas.microsoft.com/office/powerpoint/2010/main" val="3932130354"/>
+        <p14:creationId xmlns:p14="http://schemas.microsoft.com/office/powerpoint/2010/main" val="1876737671"/>
       </p:ext>
     </p:extLst>
   </p:cSld>
@@ -12916,10 +13485,42 @@
       </p:grpSpPr>
       <p:sp>
         <p:nvSpPr>
-          <p:cNvPr id="10" name="Title 1">
-            <a:extLst>
-              <a:ext uri="{FF2B5EF4-FFF2-40B4-BE49-F238E27FC236}">
-                <a16:creationId xmlns:a16="http://schemas.microsoft.com/office/drawing/2014/main" id="{222D124E-1B99-4A3E-A3A5-94D190E34124}"/>
+          <p:cNvPr id="2" name="Tijdelijke aanduiding voor dianummer 1">
+            <a:extLst>
+              <a:ext uri="{FF2B5EF4-FFF2-40B4-BE49-F238E27FC236}">
+                <a16:creationId xmlns:a16="http://schemas.microsoft.com/office/drawing/2014/main" id="{4DCB7844-3C7F-4BF1-8962-E93CD35F2A25}"/>
+              </a:ext>
+            </a:extLst>
+          </p:cNvPr>
+          <p:cNvSpPr>
+            <a:spLocks noGrp="1"/>
+          </p:cNvSpPr>
+          <p:nvPr>
+            <p:ph type="sldNum" sz="quarter" idx="10"/>
+          </p:nvPr>
+        </p:nvSpPr>
+        <p:spPr/>
+        <p:txBody>
+          <a:bodyPr/>
+          <a:lstStyle/>
+          <a:p>
+            <a:fld id="{E038E271-308C-2E46-A3EC-56326F9084CC}" type="slidenum">
+              <a:rPr lang="nl-BE" smtClean="0"/>
+              <a:pPr/>
+              <a:t>8</a:t>
+            </a:fld>
+            <a:endParaRPr lang="nl-BE" dirty="0">
+              <a:latin typeface="Calibri Light" panose="020F0302020204030204" pitchFamily="34" charset="0"/>
+            </a:endParaRPr>
+          </a:p>
+        </p:txBody>
+      </p:sp>
+      <p:sp>
+        <p:nvSpPr>
+          <p:cNvPr id="3" name="Titel 2">
+            <a:extLst>
+              <a:ext uri="{FF2B5EF4-FFF2-40B4-BE49-F238E27FC236}">
+                <a16:creationId xmlns:a16="http://schemas.microsoft.com/office/drawing/2014/main" id="{7EBC9002-4E94-4D9B-9660-90619D5C76DA}"/>
               </a:ext>
             </a:extLst>
           </p:cNvPr>
@@ -12932,8 +13533,8 @@
         </p:nvSpPr>
         <p:spPr>
           <a:xfrm>
-            <a:off x="623887" y="620713"/>
-            <a:ext cx="10944226" cy="791794"/>
+            <a:off x="811763" y="369070"/>
+            <a:ext cx="5003800" cy="1385085"/>
           </a:xfrm>
         </p:spPr>
         <p:txBody>
@@ -12941,18 +13542,18 @@
           <a:lstStyle/>
           <a:p>
             <a:r>
-              <a:rPr lang="en-US" dirty="0"/>
-              <a:t>Varia</a:t>
-            </a:r>
-          </a:p>
-        </p:txBody>
-      </p:sp>
-      <p:sp>
-        <p:nvSpPr>
-          <p:cNvPr id="2" name="Tijdelijke aanduiding voor dianummer 1">
-            <a:extLst>
-              <a:ext uri="{FF2B5EF4-FFF2-40B4-BE49-F238E27FC236}">
-                <a16:creationId xmlns:a16="http://schemas.microsoft.com/office/drawing/2014/main" id="{A3EC8642-E3F0-449F-91AE-43998925820B}"/>
+              <a:rPr lang="en-GB" dirty="0"/>
+              <a:t>State </a:t>
+            </a:r>
+          </a:p>
+        </p:txBody>
+      </p:sp>
+      <p:sp>
+        <p:nvSpPr>
+          <p:cNvPr id="5" name="Tijdelijke aanduiding voor inhoud 4">
+            <a:extLst>
+              <a:ext uri="{FF2B5EF4-FFF2-40B4-BE49-F238E27FC236}">
+                <a16:creationId xmlns:a16="http://schemas.microsoft.com/office/drawing/2014/main" id="{1EF1C9A6-2D1C-4962-A680-0FD9703A1581}"/>
               </a:ext>
             </a:extLst>
           </p:cNvPr>
@@ -12960,88 +13561,62 @@
             <a:spLocks noGrp="1"/>
           </p:cNvSpPr>
           <p:nvPr>
-            <p:ph type="sldNum" sz="quarter" idx="10"/>
+            <p:ph sz="quarter" idx="12"/>
           </p:nvPr>
         </p:nvSpPr>
         <p:spPr>
           <a:xfrm>
-            <a:off x="8923493" y="6339173"/>
-            <a:ext cx="2644619" cy="365125"/>
+            <a:off x="948107" y="5604553"/>
+            <a:ext cx="5004000" cy="614074"/>
           </a:xfrm>
         </p:spPr>
         <p:txBody>
-          <a:bodyPr anchor="ctr">
+          <a:bodyPr>
             <a:normAutofit/>
           </a:bodyPr>
           <a:lstStyle/>
           <a:p>
-            <a:pPr>
-              <a:spcAft>
-                <a:spcPts val="600"/>
-              </a:spcAft>
-            </a:pPr>
-            <a:fld id="{E038E271-308C-2E46-A3EC-56326F9084CC}" type="slidenum">
-              <a:rPr lang="nl-BE" smtClean="0"/>
-              <a:pPr>
-                <a:spcAft>
-                  <a:spcPts val="600"/>
-                </a:spcAft>
-              </a:pPr>
-              <a:t>8</a:t>
-            </a:fld>
-            <a:endParaRPr lang="nl-BE"/>
-          </a:p>
-        </p:txBody>
-      </p:sp>
-      <p:sp>
-        <p:nvSpPr>
-          <p:cNvPr id="12" name="Text Placeholder 3">
-            <a:extLst>
-              <a:ext uri="{FF2B5EF4-FFF2-40B4-BE49-F238E27FC236}">
-                <a16:creationId xmlns:a16="http://schemas.microsoft.com/office/drawing/2014/main" id="{DF619333-6079-4ABB-8FE1-F22F942AC45B}"/>
-              </a:ext>
-            </a:extLst>
-          </p:cNvPr>
-          <p:cNvSpPr>
-            <a:spLocks noGrp="1"/>
-          </p:cNvSpPr>
-          <p:nvPr>
-            <p:ph type="body" sz="quarter" idx="11"/>
-          </p:nvPr>
-        </p:nvSpPr>
+            <a:r>
+              <a:rPr lang="en-GB" sz="1800" dirty="0"/>
+              <a:t>Set a theme by using a Context class</a:t>
+            </a:r>
+          </a:p>
+        </p:txBody>
+      </p:sp>
+      <p:pic>
+        <p:nvPicPr>
+          <p:cNvPr id="6" name="Afbeelding 5">
+            <a:extLst>
+              <a:ext uri="{FF2B5EF4-FFF2-40B4-BE49-F238E27FC236}">
+                <a16:creationId xmlns:a16="http://schemas.microsoft.com/office/drawing/2014/main" id="{0943D308-A0FB-4F73-B8A5-60372B1A55AB}"/>
+              </a:ext>
+            </a:extLst>
+          </p:cNvPr>
+          <p:cNvPicPr>
+            <a:picLocks noChangeAspect="1"/>
+          </p:cNvPicPr>
+          <p:nvPr/>
+        </p:nvPicPr>
+        <p:blipFill>
+          <a:blip r:embed="rId2"/>
+          <a:stretch>
+            <a:fillRect/>
+          </a:stretch>
+        </p:blipFill>
         <p:spPr>
           <a:xfrm>
-            <a:off x="623888" y="1516380"/>
-            <a:ext cx="10944225" cy="4720907"/>
+            <a:off x="1637252" y="1061612"/>
+            <a:ext cx="8356622" cy="4304594"/>
           </a:xfrm>
+          <a:prstGeom prst="rect">
+            <a:avLst/>
+          </a:prstGeom>
         </p:spPr>
-        <p:txBody>
-          <a:bodyPr/>
-          <a:lstStyle/>
-          <a:p>
-            <a:r>
-              <a:rPr lang="en-US" dirty="0"/>
-              <a:t>Made use of Github (Github, Github Projects, Pull requests,…)</a:t>
-            </a:r>
-          </a:p>
-          <a:p>
-            <a:r>
-              <a:rPr lang="en-US" dirty="0"/>
-              <a:t>Java doc for the whole project</a:t>
-            </a:r>
-          </a:p>
-          <a:p>
-            <a:r>
-              <a:rPr lang="en-US" dirty="0"/>
-              <a:t>Testing if text fields aren’t empty</a:t>
-            </a:r>
-          </a:p>
-        </p:txBody>
-      </p:sp>
+      </p:pic>
     </p:spTree>
     <p:extLst>
       <p:ext uri="{BB962C8B-B14F-4D97-AF65-F5344CB8AC3E}">
-        <p14:creationId xmlns:p14="http://schemas.microsoft.com/office/powerpoint/2010/main" val="868021336"/>
+        <p14:creationId xmlns:p14="http://schemas.microsoft.com/office/powerpoint/2010/main" val="4054227995"/>
       </p:ext>
     </p:extLst>
   </p:cSld>
@@ -13091,7 +13666,39 @@
           <a:p>
             <a:r>
               <a:rPr lang="nl-BE" dirty="0" err="1"/>
-              <a:t>Demonstration</a:t>
+              <a:t>Sequence</a:t>
+            </a:r>
+            <a:r>
+              <a:rPr lang="nl-BE" dirty="0"/>
+              <a:t> diagram </a:t>
+            </a:r>
+            <a:r>
+              <a:rPr lang="nl-BE" dirty="0" err="1"/>
+              <a:t>for</a:t>
+            </a:r>
+            <a:r>
+              <a:rPr lang="nl-BE" dirty="0"/>
+              <a:t> </a:t>
+            </a:r>
+            <a:r>
+              <a:rPr lang="nl-BE" dirty="0" err="1"/>
+              <a:t>calculating</a:t>
+            </a:r>
+            <a:r>
+              <a:rPr lang="nl-BE" dirty="0"/>
+              <a:t> </a:t>
+            </a:r>
+            <a:r>
+              <a:rPr lang="nl-BE" dirty="0" err="1"/>
+              <a:t>the</a:t>
+            </a:r>
+            <a:r>
+              <a:rPr lang="nl-BE" dirty="0"/>
+              <a:t> </a:t>
+            </a:r>
+            <a:r>
+              <a:rPr lang="nl-BE" dirty="0" err="1"/>
+              <a:t>bill</a:t>
             </a:r>
             <a:endParaRPr lang="nl-BE" dirty="0"/>
           </a:p>
@@ -13164,10 +13771,40 @@
           </a:p>
         </p:txBody>
       </p:sp>
+      <p:pic>
+        <p:nvPicPr>
+          <p:cNvPr id="6" name="Afbeelding 5">
+            <a:extLst>
+              <a:ext uri="{FF2B5EF4-FFF2-40B4-BE49-F238E27FC236}">
+                <a16:creationId xmlns:a16="http://schemas.microsoft.com/office/drawing/2014/main" id="{8DE1BE9A-1692-44E0-AA0C-436B09E06208}"/>
+              </a:ext>
+            </a:extLst>
+          </p:cNvPr>
+          <p:cNvPicPr>
+            <a:picLocks noChangeAspect="1"/>
+          </p:cNvPicPr>
+          <p:nvPr/>
+        </p:nvPicPr>
+        <p:blipFill>
+          <a:blip r:embed="rId2"/>
+          <a:stretch>
+            <a:fillRect/>
+          </a:stretch>
+        </p:blipFill>
+        <p:spPr>
+          <a:xfrm>
+            <a:off x="2033361" y="1243920"/>
+            <a:ext cx="8125278" cy="5379494"/>
+          </a:xfrm>
+          <a:prstGeom prst="rect">
+            <a:avLst/>
+          </a:prstGeom>
+        </p:spPr>
+      </p:pic>
     </p:spTree>
     <p:extLst>
       <p:ext uri="{BB962C8B-B14F-4D97-AF65-F5344CB8AC3E}">
-        <p14:creationId xmlns:p14="http://schemas.microsoft.com/office/powerpoint/2010/main" val="1344382084"/>
+        <p14:creationId xmlns:p14="http://schemas.microsoft.com/office/powerpoint/2010/main" val="3932130354"/>
       </p:ext>
     </p:extLst>
   </p:cSld>
@@ -13498,7 +14135,7 @@
         </a:ln>
         <a:extLst>
           <a:ext uri="{91240B29-F687-4f45-9708-019B960494DF}">
-            <a14:hiddenLine xmlns:p="http://schemas.openxmlformats.org/presentationml/2006/main" xmlns="" xmlns:a14="http://schemas.microsoft.com/office/drawing/2010/main" w="9525">
+            <a14:hiddenLine xmlns:a14="http://schemas.microsoft.com/office/drawing/2010/main" xmlns="" xmlns:p="http://schemas.openxmlformats.org/presentationml/2006/main" w="9525">
               <a:solidFill>
                 <a:srgbClr val="000000"/>
               </a:solidFill>
@@ -13890,6 +14527,12 @@
 </file>
 
 <file path=customXml/item2.xml><?xml version="1.0" encoding="utf-8"?>
+<p:properties xmlns:p="http://schemas.microsoft.com/office/2006/metadata/properties" xmlns:xsi="http://www.w3.org/2001/XMLSchema-instance" xmlns:pc="http://schemas.microsoft.com/office/infopath/2007/PartnerControls">
+  <documentManagement/>
+</p:properties>
+</file>
+
+<file path=customXml/item3.xml><?xml version="1.0" encoding="utf-8"?>
 <ct:contentTypeSchema xmlns:ct="http://schemas.microsoft.com/office/2006/metadata/contentType" xmlns:ma="http://schemas.microsoft.com/office/2006/metadata/properties/metaAttributes" ct:_="" ma:_="" ma:contentTypeName="Document" ma:contentTypeID="0x010100707C9875C091B247AB9617006510CC43" ma:contentTypeVersion="9" ma:contentTypeDescription="Een nieuw document maken." ma:contentTypeScope="" ma:versionID="6792b0d8b1b497ec7b6f2fc518ad6b71">
   <xsd:schema xmlns:xsd="http://www.w3.org/2001/XMLSchema" xmlns:xs="http://www.w3.org/2001/XMLSchema" xmlns:p="http://schemas.microsoft.com/office/2006/metadata/properties" xmlns:ns2="a09e4e9c-009f-4841-8876-57cddbde6e17" xmlns:ns3="e4e19ae9-58fe-4993-a35b-a8a84bb511ff" targetNamespace="http://schemas.microsoft.com/office/2006/metadata/properties" ma:root="true" ma:fieldsID="4e3ada4487ef8e46945618bd17b59294" ns2:_="" ns3:_="">
     <xsd:import namespace="a09e4e9c-009f-4841-8876-57cddbde6e17"/>
@@ -14086,12 +14729,6 @@
 </ct:contentTypeSchema>
 </file>
 
-<file path=customXml/item3.xml><?xml version="1.0" encoding="utf-8"?>
-<p:properties xmlns:p="http://schemas.microsoft.com/office/2006/metadata/properties" xmlns:xsi="http://www.w3.org/2001/XMLSchema-instance" xmlns:pc="http://schemas.microsoft.com/office/infopath/2007/PartnerControls">
-  <documentManagement/>
-</p:properties>
-</file>
-
 <file path=customXml/itemProps1.xml><?xml version="1.0" encoding="utf-8"?>
 <ds:datastoreItem xmlns:ds="http://schemas.openxmlformats.org/officeDocument/2006/customXml" ds:itemID="{5D6EDECA-2FC6-4CC6-BF57-774C7A66E703}">
   <ds:schemaRefs>
@@ -14101,6 +14738,15 @@
 </file>
 
 <file path=customXml/itemProps2.xml><?xml version="1.0" encoding="utf-8"?>
+<ds:datastoreItem xmlns:ds="http://schemas.openxmlformats.org/officeDocument/2006/customXml" ds:itemID="{A5A93269-0A2D-4449-AFE7-E8570D6EC4CB}">
+  <ds:schemaRefs>
+    <ds:schemaRef ds:uri="http://schemas.microsoft.com/office/2006/metadata/properties"/>
+    <ds:schemaRef ds:uri="http://schemas.microsoft.com/office/infopath/2007/PartnerControls"/>
+  </ds:schemaRefs>
+</ds:datastoreItem>
+</file>
+
+<file path=customXml/itemProps3.xml><?xml version="1.0" encoding="utf-8"?>
 <ds:datastoreItem xmlns:ds="http://schemas.openxmlformats.org/officeDocument/2006/customXml" ds:itemID="{54449BF5-F7E1-46D5-B581-A176D4426B3C}">
   <ds:schemaRefs>
     <ds:schemaRef ds:uri="http://schemas.microsoft.com/office/2006/metadata/contentType"/>
@@ -14117,13 +14763,4 @@
     <ds:schemaRef ds:uri="http://schemas.microsoft.com/internal/obd"/>
   </ds:schemaRefs>
 </ds:datastoreItem>
-</file>
-
-<file path=customXml/itemProps3.xml><?xml version="1.0" encoding="utf-8"?>
-<ds:datastoreItem xmlns:ds="http://schemas.openxmlformats.org/officeDocument/2006/customXml" ds:itemID="{A5A93269-0A2D-4449-AFE7-E8570D6EC4CB}">
-  <ds:schemaRefs>
-    <ds:schemaRef ds:uri="http://schemas.microsoft.com/office/2006/metadata/properties"/>
-    <ds:schemaRef ds:uri="http://schemas.microsoft.com/office/infopath/2007/PartnerControls"/>
-  </ds:schemaRefs>
-</ds:datastoreItem>
 </file>
</xml_diff>